<commit_message>
Documentos da apresentação atualizadas. Códigos modificado devido a nova compilação.
</commit_message>
<xml_diff>
--- a/Projetos/Emotiv/Documentos 2013/Projeto_TecladoNeural/Apresentação/Apresentação Semana 30-09-2013/Apresentação Teclado Neural.pptx
+++ b/Projetos/Emotiv/Documentos 2013/Projeto_TecladoNeural/Apresentação/Apresentação Semana 30-09-2013/Apresentação Teclado Neural.pptx
@@ -13,6 +13,13 @@
     <p:sldId id="262" r:id="rId7"/>
     <p:sldId id="263" r:id="rId8"/>
     <p:sldId id="264" r:id="rId9"/>
+    <p:sldId id="265" r:id="rId10"/>
+    <p:sldId id="266" r:id="rId11"/>
+    <p:sldId id="267" r:id="rId12"/>
+    <p:sldId id="268" r:id="rId13"/>
+    <p:sldId id="269" r:id="rId14"/>
+    <p:sldId id="270" r:id="rId15"/>
+    <p:sldId id="271" r:id="rId16"/>
   </p:sldIdLst>
   <p:sldSz cx="12192000" cy="6858000"/>
   <p:notesSz cx="6858000" cy="9144000"/>
@@ -111,6 +118,11 @@
       </a:defRPr>
     </a:lvl9pPr>
   </p:defaultTextStyle>
+  <p:extLst>
+    <p:ext uri="{EFAFB233-063F-42B5-8137-9DF3F51BA10A}">
+      <p15:sldGuideLst xmlns:p15="http://schemas.microsoft.com/office/powerpoint/2012/main"/>
+    </p:ext>
+  </p:extLst>
 </p:presentation>
 </file>
 
@@ -245,7 +257,7 @@
           <a:p>
             <a:fld id="{A33E872E-E4A0-4929-B1BE-EFB4CD039DAD}" type="datetimeFigureOut">
               <a:rPr lang="pt-BR" smtClean="0"/>
-              <a:t>02/10/2013</a:t>
+              <a:t>03/10/2013</a:t>
             </a:fld>
             <a:endParaRPr lang="pt-BR"/>
           </a:p>
@@ -415,7 +427,7 @@
           <a:p>
             <a:fld id="{A33E872E-E4A0-4929-B1BE-EFB4CD039DAD}" type="datetimeFigureOut">
               <a:rPr lang="pt-BR" smtClean="0"/>
-              <a:t>02/10/2013</a:t>
+              <a:t>03/10/2013</a:t>
             </a:fld>
             <a:endParaRPr lang="pt-BR"/>
           </a:p>
@@ -595,7 +607,7 @@
           <a:p>
             <a:fld id="{A33E872E-E4A0-4929-B1BE-EFB4CD039DAD}" type="datetimeFigureOut">
               <a:rPr lang="pt-BR" smtClean="0"/>
-              <a:t>02/10/2013</a:t>
+              <a:t>03/10/2013</a:t>
             </a:fld>
             <a:endParaRPr lang="pt-BR"/>
           </a:p>
@@ -765,7 +777,7 @@
           <a:p>
             <a:fld id="{A33E872E-E4A0-4929-B1BE-EFB4CD039DAD}" type="datetimeFigureOut">
               <a:rPr lang="pt-BR" smtClean="0"/>
-              <a:t>02/10/2013</a:t>
+              <a:t>03/10/2013</a:t>
             </a:fld>
             <a:endParaRPr lang="pt-BR"/>
           </a:p>
@@ -1011,7 +1023,7 @@
           <a:p>
             <a:fld id="{A33E872E-E4A0-4929-B1BE-EFB4CD039DAD}" type="datetimeFigureOut">
               <a:rPr lang="pt-BR" smtClean="0"/>
-              <a:t>02/10/2013</a:t>
+              <a:t>03/10/2013</a:t>
             </a:fld>
             <a:endParaRPr lang="pt-BR"/>
           </a:p>
@@ -1243,7 +1255,7 @@
           <a:p>
             <a:fld id="{A33E872E-E4A0-4929-B1BE-EFB4CD039DAD}" type="datetimeFigureOut">
               <a:rPr lang="pt-BR" smtClean="0"/>
-              <a:t>02/10/2013</a:t>
+              <a:t>03/10/2013</a:t>
             </a:fld>
             <a:endParaRPr lang="pt-BR"/>
           </a:p>
@@ -1610,7 +1622,7 @@
           <a:p>
             <a:fld id="{A33E872E-E4A0-4929-B1BE-EFB4CD039DAD}" type="datetimeFigureOut">
               <a:rPr lang="pt-BR" smtClean="0"/>
-              <a:t>02/10/2013</a:t>
+              <a:t>03/10/2013</a:t>
             </a:fld>
             <a:endParaRPr lang="pt-BR"/>
           </a:p>
@@ -1728,7 +1740,7 @@
           <a:p>
             <a:fld id="{A33E872E-E4A0-4929-B1BE-EFB4CD039DAD}" type="datetimeFigureOut">
               <a:rPr lang="pt-BR" smtClean="0"/>
-              <a:t>02/10/2013</a:t>
+              <a:t>03/10/2013</a:t>
             </a:fld>
             <a:endParaRPr lang="pt-BR"/>
           </a:p>
@@ -1823,7 +1835,7 @@
           <a:p>
             <a:fld id="{A33E872E-E4A0-4929-B1BE-EFB4CD039DAD}" type="datetimeFigureOut">
               <a:rPr lang="pt-BR" smtClean="0"/>
-              <a:t>02/10/2013</a:t>
+              <a:t>03/10/2013</a:t>
             </a:fld>
             <a:endParaRPr lang="pt-BR"/>
           </a:p>
@@ -2100,7 +2112,7 @@
           <a:p>
             <a:fld id="{A33E872E-E4A0-4929-B1BE-EFB4CD039DAD}" type="datetimeFigureOut">
               <a:rPr lang="pt-BR" smtClean="0"/>
-              <a:t>02/10/2013</a:t>
+              <a:t>03/10/2013</a:t>
             </a:fld>
             <a:endParaRPr lang="pt-BR"/>
           </a:p>
@@ -2353,7 +2365,7 @@
           <a:p>
             <a:fld id="{A33E872E-E4A0-4929-B1BE-EFB4CD039DAD}" type="datetimeFigureOut">
               <a:rPr lang="pt-BR" smtClean="0"/>
-              <a:t>02/10/2013</a:t>
+              <a:t>03/10/2013</a:t>
             </a:fld>
             <a:endParaRPr lang="pt-BR"/>
           </a:p>
@@ -2584,7 +2596,7 @@
           <a:p>
             <a:fld id="{A33E872E-E4A0-4929-B1BE-EFB4CD039DAD}" type="datetimeFigureOut">
               <a:rPr lang="pt-BR" smtClean="0"/>
-              <a:t>02/10/2013</a:t>
+              <a:t>03/10/2013</a:t>
             </a:fld>
             <a:endParaRPr lang="pt-BR"/>
           </a:p>
@@ -3110,6 +3122,594 @@
 </p:sld>
 </file>
 
+<file path=ppt/slides/slide10.xml><?xml version="1.0" encoding="utf-8"?>
+<p:sld xmlns:a="http://schemas.openxmlformats.org/drawingml/2006/main" xmlns:r="http://schemas.openxmlformats.org/officeDocument/2006/relationships" xmlns:p="http://schemas.openxmlformats.org/presentationml/2006/main">
+  <p:cSld>
+    <p:spTree>
+      <p:nvGrpSpPr>
+        <p:cNvPr id="1" name=""/>
+        <p:cNvGrpSpPr/>
+        <p:nvPr/>
+      </p:nvGrpSpPr>
+      <p:grpSpPr>
+        <a:xfrm>
+          <a:off x="0" y="0"/>
+          <a:ext cx="0" cy="0"/>
+          <a:chOff x="0" y="0"/>
+          <a:chExt cx="0" cy="0"/>
+        </a:xfrm>
+      </p:grpSpPr>
+      <p:sp>
+        <p:nvSpPr>
+          <p:cNvPr id="2" name="Título 1"/>
+          <p:cNvSpPr>
+            <a:spLocks noGrp="1"/>
+          </p:cNvSpPr>
+          <p:nvPr>
+            <p:ph type="title"/>
+          </p:nvPr>
+        </p:nvSpPr>
+        <p:spPr/>
+        <p:txBody>
+          <a:bodyPr/>
+          <a:lstStyle/>
+          <a:p>
+            <a:r>
+              <a:rPr lang="pt-BR" dirty="0" smtClean="0"/>
+              <a:t>EML</a:t>
+            </a:r>
+            <a:endParaRPr lang="pt-BR" dirty="0"/>
+          </a:p>
+        </p:txBody>
+      </p:sp>
+      <p:pic>
+        <p:nvPicPr>
+          <p:cNvPr id="4" name="Espaço Reservado para Conteúdo 3"/>
+          <p:cNvPicPr>
+            <a:picLocks noGrp="1" noChangeAspect="1"/>
+          </p:cNvPicPr>
+          <p:nvPr>
+            <p:ph idx="1"/>
+          </p:nvPr>
+        </p:nvPicPr>
+        <p:blipFill>
+          <a:blip r:embed="rId2"/>
+          <a:stretch>
+            <a:fillRect/>
+          </a:stretch>
+        </p:blipFill>
+        <p:spPr>
+          <a:xfrm>
+            <a:off x="3281083" y="365125"/>
+            <a:ext cx="7328318" cy="6285370"/>
+          </a:xfrm>
+          <a:prstGeom prst="rect">
+            <a:avLst/>
+          </a:prstGeom>
+        </p:spPr>
+      </p:pic>
+    </p:spTree>
+    <p:extLst>
+      <p:ext uri="{BB962C8B-B14F-4D97-AF65-F5344CB8AC3E}">
+        <p14:creationId xmlns:p14="http://schemas.microsoft.com/office/powerpoint/2010/main" val="846687474"/>
+      </p:ext>
+    </p:extLst>
+  </p:cSld>
+  <p:clrMapOvr>
+    <a:masterClrMapping/>
+  </p:clrMapOvr>
+  <p:timing>
+    <p:tnLst>
+      <p:par>
+        <p:cTn id="1" dur="indefinite" restart="never" nodeType="tmRoot"/>
+      </p:par>
+    </p:tnLst>
+  </p:timing>
+</p:sld>
+</file>
+
+<file path=ppt/slides/slide11.xml><?xml version="1.0" encoding="utf-8"?>
+<p:sld xmlns:a="http://schemas.openxmlformats.org/drawingml/2006/main" xmlns:r="http://schemas.openxmlformats.org/officeDocument/2006/relationships" xmlns:p="http://schemas.openxmlformats.org/presentationml/2006/main">
+  <p:cSld>
+    <p:spTree>
+      <p:nvGrpSpPr>
+        <p:cNvPr id="1" name=""/>
+        <p:cNvGrpSpPr/>
+        <p:nvPr/>
+      </p:nvGrpSpPr>
+      <p:grpSpPr>
+        <a:xfrm>
+          <a:off x="0" y="0"/>
+          <a:ext cx="0" cy="0"/>
+          <a:chOff x="0" y="0"/>
+          <a:chExt cx="0" cy="0"/>
+        </a:xfrm>
+      </p:grpSpPr>
+      <p:sp>
+        <p:nvSpPr>
+          <p:cNvPr id="2" name="Título 1"/>
+          <p:cNvSpPr>
+            <a:spLocks noGrp="1"/>
+          </p:cNvSpPr>
+          <p:nvPr>
+            <p:ph type="title"/>
+          </p:nvPr>
+        </p:nvSpPr>
+        <p:spPr/>
+        <p:txBody>
+          <a:bodyPr/>
+          <a:lstStyle/>
+          <a:p>
+            <a:r>
+              <a:rPr lang="pt-BR" dirty="0" smtClean="0"/>
+              <a:t>SDK</a:t>
+            </a:r>
+            <a:endParaRPr lang="pt-BR" dirty="0"/>
+          </a:p>
+        </p:txBody>
+      </p:sp>
+      <p:sp>
+        <p:nvSpPr>
+          <p:cNvPr id="3" name="Espaço Reservado para Conteúdo 2"/>
+          <p:cNvSpPr>
+            <a:spLocks noGrp="1"/>
+          </p:cNvSpPr>
+          <p:nvPr>
+            <p:ph idx="1"/>
+          </p:nvPr>
+        </p:nvSpPr>
+        <p:spPr/>
+        <p:txBody>
+          <a:bodyPr/>
+          <a:lstStyle/>
+          <a:p>
+            <a:r>
+              <a:rPr lang="pt-BR" dirty="0" err="1" smtClean="0"/>
+              <a:t>APIs</a:t>
+            </a:r>
+            <a:r>
+              <a:rPr lang="pt-BR" dirty="0" smtClean="0"/>
+              <a:t> </a:t>
+            </a:r>
+            <a:r>
+              <a:rPr lang="pt-BR" dirty="0" err="1" smtClean="0"/>
+              <a:t>Emotiv</a:t>
+            </a:r>
+            <a:r>
+              <a:rPr lang="pt-BR" dirty="0" smtClean="0"/>
+              <a:t> para o desenvolvimento de aplicativos com a interação do </a:t>
+            </a:r>
+            <a:r>
+              <a:rPr lang="pt-BR" dirty="0" err="1" smtClean="0"/>
+              <a:t>Headset</a:t>
+            </a:r>
+            <a:r>
+              <a:rPr lang="pt-BR" dirty="0" smtClean="0"/>
+              <a:t>.</a:t>
+            </a:r>
+          </a:p>
+          <a:p>
+            <a:r>
+              <a:rPr lang="pt-BR" dirty="0" smtClean="0"/>
+              <a:t>IDE – Visual Studio 2010 C++</a:t>
+            </a:r>
+            <a:endParaRPr lang="pt-BR" dirty="0"/>
+          </a:p>
+        </p:txBody>
+      </p:sp>
+    </p:spTree>
+    <p:extLst>
+      <p:ext uri="{BB962C8B-B14F-4D97-AF65-F5344CB8AC3E}">
+        <p14:creationId xmlns:p14="http://schemas.microsoft.com/office/powerpoint/2010/main" val="2705668037"/>
+      </p:ext>
+    </p:extLst>
+  </p:cSld>
+  <p:clrMapOvr>
+    <a:masterClrMapping/>
+  </p:clrMapOvr>
+  <p:timing>
+    <p:tnLst>
+      <p:par>
+        <p:cTn id="1" dur="indefinite" restart="never" nodeType="tmRoot"/>
+      </p:par>
+    </p:tnLst>
+  </p:timing>
+</p:sld>
+</file>
+
+<file path=ppt/slides/slide12.xml><?xml version="1.0" encoding="utf-8"?>
+<p:sld xmlns:a="http://schemas.openxmlformats.org/drawingml/2006/main" xmlns:r="http://schemas.openxmlformats.org/officeDocument/2006/relationships" xmlns:p="http://schemas.openxmlformats.org/presentationml/2006/main">
+  <p:cSld>
+    <p:spTree>
+      <p:nvGrpSpPr>
+        <p:cNvPr id="1" name=""/>
+        <p:cNvGrpSpPr/>
+        <p:nvPr/>
+      </p:nvGrpSpPr>
+      <p:grpSpPr>
+        <a:xfrm>
+          <a:off x="0" y="0"/>
+          <a:ext cx="0" cy="0"/>
+          <a:chOff x="0" y="0"/>
+          <a:chExt cx="0" cy="0"/>
+        </a:xfrm>
+      </p:grpSpPr>
+      <p:sp>
+        <p:nvSpPr>
+          <p:cNvPr id="2" name="Título 1"/>
+          <p:cNvSpPr>
+            <a:spLocks noGrp="1"/>
+          </p:cNvSpPr>
+          <p:nvPr>
+            <p:ph type="title"/>
+          </p:nvPr>
+        </p:nvSpPr>
+        <p:spPr/>
+        <p:txBody>
+          <a:bodyPr/>
+          <a:lstStyle/>
+          <a:p>
+            <a:r>
+              <a:rPr lang="pt-BR" dirty="0" smtClean="0"/>
+              <a:t>Teclado Neural</a:t>
+            </a:r>
+            <a:endParaRPr lang="pt-BR" dirty="0"/>
+          </a:p>
+        </p:txBody>
+      </p:sp>
+      <p:pic>
+        <p:nvPicPr>
+          <p:cNvPr id="5" name="Espaço Reservado para Conteúdo 4"/>
+          <p:cNvPicPr>
+            <a:picLocks noGrp="1" noChangeAspect="1"/>
+          </p:cNvPicPr>
+          <p:nvPr>
+            <p:ph idx="1"/>
+          </p:nvPr>
+        </p:nvPicPr>
+        <p:blipFill>
+          <a:blip r:embed="rId2"/>
+          <a:stretch>
+            <a:fillRect/>
+          </a:stretch>
+        </p:blipFill>
+        <p:spPr>
+          <a:xfrm>
+            <a:off x="3925372" y="1586753"/>
+            <a:ext cx="7595519" cy="4872597"/>
+          </a:xfrm>
+          <a:prstGeom prst="rect">
+            <a:avLst/>
+          </a:prstGeom>
+        </p:spPr>
+      </p:pic>
+    </p:spTree>
+    <p:extLst>
+      <p:ext uri="{BB962C8B-B14F-4D97-AF65-F5344CB8AC3E}">
+        <p14:creationId xmlns:p14="http://schemas.microsoft.com/office/powerpoint/2010/main" val="1769983059"/>
+      </p:ext>
+    </p:extLst>
+  </p:cSld>
+  <p:clrMapOvr>
+    <a:masterClrMapping/>
+  </p:clrMapOvr>
+  <p:timing>
+    <p:tnLst>
+      <p:par>
+        <p:cTn id="1" dur="indefinite" restart="never" nodeType="tmRoot"/>
+      </p:par>
+    </p:tnLst>
+  </p:timing>
+</p:sld>
+</file>
+
+<file path=ppt/slides/slide13.xml><?xml version="1.0" encoding="utf-8"?>
+<p:sld xmlns:a="http://schemas.openxmlformats.org/drawingml/2006/main" xmlns:r="http://schemas.openxmlformats.org/officeDocument/2006/relationships" xmlns:p="http://schemas.openxmlformats.org/presentationml/2006/main">
+  <p:cSld>
+    <p:spTree>
+      <p:nvGrpSpPr>
+        <p:cNvPr id="1" name=""/>
+        <p:cNvGrpSpPr/>
+        <p:nvPr/>
+      </p:nvGrpSpPr>
+      <p:grpSpPr>
+        <a:xfrm>
+          <a:off x="0" y="0"/>
+          <a:ext cx="0" cy="0"/>
+          <a:chOff x="0" y="0"/>
+          <a:chExt cx="0" cy="0"/>
+        </a:xfrm>
+      </p:grpSpPr>
+      <p:sp>
+        <p:nvSpPr>
+          <p:cNvPr id="2" name="Título 1"/>
+          <p:cNvSpPr>
+            <a:spLocks noGrp="1"/>
+          </p:cNvSpPr>
+          <p:nvPr>
+            <p:ph type="title"/>
+          </p:nvPr>
+        </p:nvSpPr>
+        <p:spPr/>
+        <p:txBody>
+          <a:bodyPr/>
+          <a:lstStyle/>
+          <a:p>
+            <a:r>
+              <a:rPr lang="pt-BR" dirty="0" smtClean="0"/>
+              <a:t>Evolução</a:t>
+            </a:r>
+            <a:endParaRPr lang="pt-BR" dirty="0"/>
+          </a:p>
+        </p:txBody>
+      </p:sp>
+      <p:sp>
+        <p:nvSpPr>
+          <p:cNvPr id="3" name="Espaço Reservado para Conteúdo 2"/>
+          <p:cNvSpPr>
+            <a:spLocks noGrp="1"/>
+          </p:cNvSpPr>
+          <p:nvPr>
+            <p:ph idx="1"/>
+          </p:nvPr>
+        </p:nvSpPr>
+        <p:spPr/>
+        <p:txBody>
+          <a:bodyPr/>
+          <a:lstStyle/>
+          <a:p>
+            <a:r>
+              <a:rPr lang="pt-BR" dirty="0" smtClean="0"/>
+              <a:t>Entender as </a:t>
+            </a:r>
+            <a:r>
+              <a:rPr lang="pt-BR" dirty="0" err="1" smtClean="0"/>
+              <a:t>APIs</a:t>
+            </a:r>
+            <a:endParaRPr lang="pt-BR" dirty="0" smtClean="0"/>
+          </a:p>
+          <a:p>
+            <a:r>
+              <a:rPr lang="pt-BR" dirty="0" smtClean="0"/>
+              <a:t>Capturar valores das Expressões</a:t>
+            </a:r>
+          </a:p>
+          <a:p>
+            <a:r>
+              <a:rPr lang="pt-BR" dirty="0" smtClean="0"/>
+              <a:t>Lógica de identificação das Expressões (olhar à direita, piscar olhos)</a:t>
+            </a:r>
+          </a:p>
+          <a:p>
+            <a:r>
+              <a:rPr lang="pt-BR" dirty="0" smtClean="0"/>
+              <a:t>Entender EML</a:t>
+            </a:r>
+          </a:p>
+          <a:p>
+            <a:r>
+              <a:rPr lang="pt-BR" dirty="0" smtClean="0"/>
+              <a:t>Script básico em EML</a:t>
+            </a:r>
+          </a:p>
+          <a:p>
+            <a:r>
+              <a:rPr lang="pt-BR" dirty="0" smtClean="0"/>
+              <a:t>Desenvolvimento do layout do teclado</a:t>
+            </a:r>
+          </a:p>
+          <a:p>
+            <a:r>
+              <a:rPr lang="pt-BR" dirty="0" smtClean="0"/>
+              <a:t>Conexão do </a:t>
+            </a:r>
+            <a:r>
+              <a:rPr lang="pt-BR" dirty="0" err="1" smtClean="0"/>
+              <a:t>Headset</a:t>
+            </a:r>
+            <a:r>
+              <a:rPr lang="pt-BR" dirty="0" smtClean="0"/>
+              <a:t> ao Teclado Neural</a:t>
+            </a:r>
+            <a:endParaRPr lang="pt-BR" dirty="0"/>
+          </a:p>
+        </p:txBody>
+      </p:sp>
+    </p:spTree>
+    <p:extLst>
+      <p:ext uri="{BB962C8B-B14F-4D97-AF65-F5344CB8AC3E}">
+        <p14:creationId xmlns:p14="http://schemas.microsoft.com/office/powerpoint/2010/main" val="1092836846"/>
+      </p:ext>
+    </p:extLst>
+  </p:cSld>
+  <p:clrMapOvr>
+    <a:masterClrMapping/>
+  </p:clrMapOvr>
+  <p:timing>
+    <p:tnLst>
+      <p:par>
+        <p:cTn id="1" dur="indefinite" restart="never" nodeType="tmRoot"/>
+      </p:par>
+    </p:tnLst>
+  </p:timing>
+</p:sld>
+</file>
+
+<file path=ppt/slides/slide14.xml><?xml version="1.0" encoding="utf-8"?>
+<p:sld xmlns:a="http://schemas.openxmlformats.org/drawingml/2006/main" xmlns:r="http://schemas.openxmlformats.org/officeDocument/2006/relationships" xmlns:p="http://schemas.openxmlformats.org/presentationml/2006/main">
+  <p:cSld>
+    <p:spTree>
+      <p:nvGrpSpPr>
+        <p:cNvPr id="1" name=""/>
+        <p:cNvGrpSpPr/>
+        <p:nvPr/>
+      </p:nvGrpSpPr>
+      <p:grpSpPr>
+        <a:xfrm>
+          <a:off x="0" y="0"/>
+          <a:ext cx="0" cy="0"/>
+          <a:chOff x="0" y="0"/>
+          <a:chExt cx="0" cy="0"/>
+        </a:xfrm>
+      </p:grpSpPr>
+      <p:sp>
+        <p:nvSpPr>
+          <p:cNvPr id="2" name="Título 1"/>
+          <p:cNvSpPr>
+            <a:spLocks noGrp="1"/>
+          </p:cNvSpPr>
+          <p:nvPr>
+            <p:ph type="title"/>
+          </p:nvPr>
+        </p:nvSpPr>
+        <p:spPr/>
+        <p:txBody>
+          <a:bodyPr/>
+          <a:lstStyle/>
+          <a:p>
+            <a:r>
+              <a:rPr lang="pt-BR" dirty="0" smtClean="0"/>
+              <a:t>Próximos Passos</a:t>
+            </a:r>
+            <a:endParaRPr lang="pt-BR" dirty="0"/>
+          </a:p>
+        </p:txBody>
+      </p:sp>
+      <p:sp>
+        <p:nvSpPr>
+          <p:cNvPr id="3" name="Espaço Reservado para Conteúdo 2"/>
+          <p:cNvSpPr>
+            <a:spLocks noGrp="1"/>
+          </p:cNvSpPr>
+          <p:nvPr>
+            <p:ph idx="1"/>
+          </p:nvPr>
+        </p:nvSpPr>
+        <p:spPr/>
+        <p:txBody>
+          <a:bodyPr/>
+          <a:lstStyle/>
+          <a:p>
+            <a:r>
+              <a:rPr lang="pt-BR" dirty="0" smtClean="0"/>
+              <a:t>Criar lógica para adicionar eventos nos botões conforme expressões</a:t>
+            </a:r>
+          </a:p>
+          <a:p>
+            <a:pPr lvl="1"/>
+            <a:r>
+              <a:rPr lang="pt-BR" dirty="0" err="1" smtClean="0"/>
+              <a:t>Ex</a:t>
+            </a:r>
+            <a:r>
+              <a:rPr lang="pt-BR" dirty="0" smtClean="0"/>
+              <a:t>: ao olhar para a direta deslocar o cursor do teclado para a direita.</a:t>
+            </a:r>
+          </a:p>
+          <a:p>
+            <a:pPr lvl="1"/>
+            <a:r>
+              <a:rPr lang="pt-BR" dirty="0" err="1" smtClean="0"/>
+              <a:t>Ex</a:t>
+            </a:r>
+            <a:r>
+              <a:rPr lang="pt-BR" dirty="0" smtClean="0"/>
+              <a:t>: ao piscar, ativar um clique no botão.</a:t>
+            </a:r>
+          </a:p>
+          <a:p>
+            <a:endParaRPr lang="pt-BR" dirty="0" smtClean="0"/>
+          </a:p>
+          <a:p>
+            <a:endParaRPr lang="pt-BR" dirty="0"/>
+          </a:p>
+        </p:txBody>
+      </p:sp>
+    </p:spTree>
+    <p:extLst>
+      <p:ext uri="{BB962C8B-B14F-4D97-AF65-F5344CB8AC3E}">
+        <p14:creationId xmlns:p14="http://schemas.microsoft.com/office/powerpoint/2010/main" val="2022650653"/>
+      </p:ext>
+    </p:extLst>
+  </p:cSld>
+  <p:clrMapOvr>
+    <a:masterClrMapping/>
+  </p:clrMapOvr>
+  <p:timing>
+    <p:tnLst>
+      <p:par>
+        <p:cTn id="1" dur="indefinite" restart="never" nodeType="tmRoot"/>
+      </p:par>
+    </p:tnLst>
+  </p:timing>
+</p:sld>
+</file>
+
+<file path=ppt/slides/slide15.xml><?xml version="1.0" encoding="utf-8"?>
+<p:sld xmlns:a="http://schemas.openxmlformats.org/drawingml/2006/main" xmlns:r="http://schemas.openxmlformats.org/officeDocument/2006/relationships" xmlns:p="http://schemas.openxmlformats.org/presentationml/2006/main">
+  <p:cSld>
+    <p:spTree>
+      <p:nvGrpSpPr>
+        <p:cNvPr id="1" name=""/>
+        <p:cNvGrpSpPr/>
+        <p:nvPr/>
+      </p:nvGrpSpPr>
+      <p:grpSpPr>
+        <a:xfrm>
+          <a:off x="0" y="0"/>
+          <a:ext cx="0" cy="0"/>
+          <a:chOff x="0" y="0"/>
+          <a:chExt cx="0" cy="0"/>
+        </a:xfrm>
+      </p:grpSpPr>
+      <p:sp>
+        <p:nvSpPr>
+          <p:cNvPr id="2" name="Título 1"/>
+          <p:cNvSpPr>
+            <a:spLocks noGrp="1"/>
+          </p:cNvSpPr>
+          <p:nvPr>
+            <p:ph type="title"/>
+          </p:nvPr>
+        </p:nvSpPr>
+        <p:spPr>
+          <a:xfrm>
+            <a:off x="891988" y="2180478"/>
+            <a:ext cx="10515600" cy="1325563"/>
+          </a:xfrm>
+        </p:spPr>
+        <p:txBody>
+          <a:bodyPr/>
+          <a:lstStyle/>
+          <a:p>
+            <a:r>
+              <a:rPr lang="pt-BR" dirty="0" smtClean="0"/>
+              <a:t>Obrigado!</a:t>
+            </a:r>
+            <a:endParaRPr lang="pt-BR" dirty="0"/>
+          </a:p>
+        </p:txBody>
+      </p:sp>
+    </p:spTree>
+    <p:extLst>
+      <p:ext uri="{BB962C8B-B14F-4D97-AF65-F5344CB8AC3E}">
+        <p14:creationId xmlns:p14="http://schemas.microsoft.com/office/powerpoint/2010/main" val="2998808177"/>
+      </p:ext>
+    </p:extLst>
+  </p:cSld>
+  <p:clrMapOvr>
+    <a:masterClrMapping/>
+  </p:clrMapOvr>
+  <p:timing>
+    <p:tnLst>
+      <p:par>
+        <p:cTn id="1" dur="indefinite" restart="never" nodeType="tmRoot"/>
+      </p:par>
+    </p:tnLst>
+  </p:timing>
+</p:sld>
+</file>
+
 <file path=ppt/slides/slide2.xml><?xml version="1.0" encoding="utf-8"?>
 <p:sld xmlns:a="http://schemas.openxmlformats.org/drawingml/2006/main" xmlns:r="http://schemas.openxmlformats.org/officeDocument/2006/relationships" xmlns:p="http://schemas.openxmlformats.org/presentationml/2006/main">
   <p:cSld>
@@ -3855,6 +4455,92 @@
     <p:extLst>
       <p:ext uri="{BB962C8B-B14F-4D97-AF65-F5344CB8AC3E}">
         <p14:creationId xmlns:p14="http://schemas.microsoft.com/office/powerpoint/2010/main" val="3106517706"/>
+      </p:ext>
+    </p:extLst>
+  </p:cSld>
+  <p:clrMapOvr>
+    <a:masterClrMapping/>
+  </p:clrMapOvr>
+  <p:timing>
+    <p:tnLst>
+      <p:par>
+        <p:cTn id="1" dur="indefinite" restart="never" nodeType="tmRoot"/>
+      </p:par>
+    </p:tnLst>
+  </p:timing>
+</p:sld>
+</file>
+
+<file path=ppt/slides/slide9.xml><?xml version="1.0" encoding="utf-8"?>
+<p:sld xmlns:a="http://schemas.openxmlformats.org/drawingml/2006/main" xmlns:r="http://schemas.openxmlformats.org/officeDocument/2006/relationships" xmlns:p="http://schemas.openxmlformats.org/presentationml/2006/main">
+  <p:cSld>
+    <p:spTree>
+      <p:nvGrpSpPr>
+        <p:cNvPr id="1" name=""/>
+        <p:cNvGrpSpPr/>
+        <p:nvPr/>
+      </p:nvGrpSpPr>
+      <p:grpSpPr>
+        <a:xfrm>
+          <a:off x="0" y="0"/>
+          <a:ext cx="0" cy="0"/>
+          <a:chOff x="0" y="0"/>
+          <a:chExt cx="0" cy="0"/>
+        </a:xfrm>
+      </p:grpSpPr>
+      <p:sp>
+        <p:nvSpPr>
+          <p:cNvPr id="2" name="Título 1"/>
+          <p:cNvSpPr>
+            <a:spLocks noGrp="1"/>
+          </p:cNvSpPr>
+          <p:nvPr>
+            <p:ph type="title"/>
+          </p:nvPr>
+        </p:nvSpPr>
+        <p:spPr/>
+        <p:txBody>
+          <a:bodyPr/>
+          <a:lstStyle/>
+          <a:p>
+            <a:r>
+              <a:rPr lang="pt-BR" dirty="0" err="1" smtClean="0"/>
+              <a:t>EmoKey</a:t>
+            </a:r>
+            <a:endParaRPr lang="pt-BR" dirty="0"/>
+          </a:p>
+        </p:txBody>
+      </p:sp>
+      <p:pic>
+        <p:nvPicPr>
+          <p:cNvPr id="4" name="Espaço Reservado para Conteúdo 3"/>
+          <p:cNvPicPr>
+            <a:picLocks noGrp="1" noChangeAspect="1"/>
+          </p:cNvPicPr>
+          <p:nvPr>
+            <p:ph idx="1"/>
+          </p:nvPr>
+        </p:nvPicPr>
+        <p:blipFill>
+          <a:blip r:embed="rId2"/>
+          <a:stretch>
+            <a:fillRect/>
+          </a:stretch>
+        </p:blipFill>
+        <p:spPr>
+          <a:xfrm>
+            <a:off x="4007223" y="655117"/>
+            <a:ext cx="6916271" cy="5769824"/>
+          </a:xfrm>
+          <a:prstGeom prst="rect">
+            <a:avLst/>
+          </a:prstGeom>
+        </p:spPr>
+      </p:pic>
+    </p:spTree>
+    <p:extLst>
+      <p:ext uri="{BB962C8B-B14F-4D97-AF65-F5344CB8AC3E}">
+        <p14:creationId xmlns:p14="http://schemas.microsoft.com/office/powerpoint/2010/main" val="2077635957"/>
       </p:ext>
     </p:extLst>
   </p:cSld>

</xml_diff>